<commit_message>
some notes on agents
</commit_message>
<xml_diff>
--- a/slides/LanguageModels_2.pptx
+++ b/slides/LanguageModels_2.pptx
@@ -5,7 +5,7 @@
     <p:sldMasterId id="2147483648" r:id="rId1"/>
   </p:sldMasterIdLst>
   <p:notesMasterIdLst>
-    <p:notesMasterId r:id="rId24"/>
+    <p:notesMasterId r:id="rId25"/>
   </p:notesMasterIdLst>
   <p:sldIdLst>
     <p:sldId id="278" r:id="rId2"/>
@@ -26,10 +26,11 @@
     <p:sldId id="338" r:id="rId17"/>
     <p:sldId id="287" r:id="rId18"/>
     <p:sldId id="695" r:id="rId19"/>
-    <p:sldId id="320" r:id="rId20"/>
-    <p:sldId id="334" r:id="rId21"/>
-    <p:sldId id="336" r:id="rId22"/>
-    <p:sldId id="693" r:id="rId23"/>
+    <p:sldId id="575" r:id="rId20"/>
+    <p:sldId id="320" r:id="rId21"/>
+    <p:sldId id="334" r:id="rId22"/>
+    <p:sldId id="336" r:id="rId23"/>
+    <p:sldId id="693" r:id="rId24"/>
   </p:sldIdLst>
   <p:sldSz cx="12192000" cy="6858000"/>
   <p:notesSz cx="6858000" cy="9144000"/>
@@ -966,7 +967,7 @@
           <a:p>
             <a:fld id="{22D193DB-18D6-9041-9C70-C24EC80A4B6E}" type="datetimeFigureOut">
               <a:rPr lang="en-DE" smtClean="0"/>
-              <a:t>06/09/2024</a:t>
+              <a:t>06/16/2024</a:t>
             </a:fld>
             <a:endParaRPr lang="en-DE"/>
           </a:p>
@@ -1383,7 +1384,7 @@
           <a:p>
             <a:fld id="{120A37E0-810F-7549-BC85-637D5E1FD51D}" type="datetime1">
               <a:rPr lang="de-DE" smtClean="0"/>
-              <a:t>09.06.2024</a:t>
+              <a:t>16.06.2024</a:t>
             </a:fld>
             <a:endParaRPr lang="en-DE"/>
           </a:p>
@@ -1583,7 +1584,7 @@
           <a:p>
             <a:fld id="{B5CDBC61-5CF0-994A-BBF1-D8BFDE2785EA}" type="datetime1">
               <a:rPr lang="de-DE" smtClean="0"/>
-              <a:t>09.06.2024</a:t>
+              <a:t>16.06.2024</a:t>
             </a:fld>
             <a:endParaRPr lang="en-DE"/>
           </a:p>
@@ -1793,7 +1794,7 @@
           <a:p>
             <a:fld id="{980A3FD2-7E37-5748-BA1D-94B47BDE01D2}" type="datetime1">
               <a:rPr lang="de-DE" smtClean="0"/>
-              <a:t>09.06.2024</a:t>
+              <a:t>16.06.2024</a:t>
             </a:fld>
             <a:endParaRPr lang="en-DE"/>
           </a:p>
@@ -1993,7 +1994,7 @@
           <a:p>
             <a:fld id="{4D11A56E-48A2-C749-920A-4760650BEACB}" type="datetime1">
               <a:rPr lang="de-DE" smtClean="0"/>
-              <a:t>09.06.2024</a:t>
+              <a:t>16.06.2024</a:t>
             </a:fld>
             <a:endParaRPr lang="en-DE"/>
           </a:p>
@@ -2269,7 +2270,7 @@
           <a:p>
             <a:fld id="{193B0F02-0DA7-1D4C-B01D-75FC069092E3}" type="datetime1">
               <a:rPr lang="de-DE" smtClean="0"/>
-              <a:t>09.06.2024</a:t>
+              <a:t>16.06.2024</a:t>
             </a:fld>
             <a:endParaRPr lang="en-DE"/>
           </a:p>
@@ -2537,7 +2538,7 @@
           <a:p>
             <a:fld id="{51E8D128-44CC-154C-A764-DD0D7DFC9804}" type="datetime1">
               <a:rPr lang="de-DE" smtClean="0"/>
-              <a:t>09.06.2024</a:t>
+              <a:t>16.06.2024</a:t>
             </a:fld>
             <a:endParaRPr lang="en-DE"/>
           </a:p>
@@ -2952,7 +2953,7 @@
           <a:p>
             <a:fld id="{E64FFC17-B050-FC42-BF31-AD49CE23E4C7}" type="datetime1">
               <a:rPr lang="de-DE" smtClean="0"/>
-              <a:t>09.06.2024</a:t>
+              <a:t>16.06.2024</a:t>
             </a:fld>
             <a:endParaRPr lang="en-DE"/>
           </a:p>
@@ -3094,7 +3095,7 @@
           <a:p>
             <a:fld id="{AAA4E4F4-7BF7-5E46-9EF1-2DD0A201804D}" type="datetime1">
               <a:rPr lang="de-DE" smtClean="0"/>
-              <a:t>09.06.2024</a:t>
+              <a:t>16.06.2024</a:t>
             </a:fld>
             <a:endParaRPr lang="en-DE"/>
           </a:p>
@@ -3207,7 +3208,7 @@
           <a:p>
             <a:fld id="{D36C36D5-B192-FA47-9073-DA2AE91E7929}" type="datetime1">
               <a:rPr lang="de-DE" smtClean="0"/>
-              <a:t>09.06.2024</a:t>
+              <a:t>16.06.2024</a:t>
             </a:fld>
             <a:endParaRPr lang="en-DE"/>
           </a:p>
@@ -3520,7 +3521,7 @@
           <a:p>
             <a:fld id="{9EF55385-6396-FD45-BEFF-727CA0DA3623}" type="datetime1">
               <a:rPr lang="de-DE" smtClean="0"/>
-              <a:t>09.06.2024</a:t>
+              <a:t>16.06.2024</a:t>
             </a:fld>
             <a:endParaRPr lang="en-DE"/>
           </a:p>
@@ -3809,7 +3810,7 @@
           <a:p>
             <a:fld id="{FC21FF0E-D010-174A-A1C6-50F9DF078759}" type="datetime1">
               <a:rPr lang="de-DE" smtClean="0"/>
-              <a:t>09.06.2024</a:t>
+              <a:t>16.06.2024</a:t>
             </a:fld>
             <a:endParaRPr lang="en-DE"/>
           </a:p>
@@ -4052,7 +4053,7 @@
           <a:p>
             <a:fld id="{575AFE25-413A-474D-A500-11DF768B34B3}" type="datetime1">
               <a:rPr lang="de-DE" smtClean="0"/>
-              <a:t>09.06.2024</a:t>
+              <a:t>16.06.2024</a:t>
             </a:fld>
             <a:endParaRPr lang="en-DE"/>
           </a:p>
@@ -6987,7 +6988,7 @@
           <a:p>
             <a:r>
               <a:rPr lang="en-GB" dirty="0"/>
-              <a:t>Limitations</a:t>
+              <a:t>LLM Agents</a:t>
             </a:r>
           </a:p>
         </p:txBody>
@@ -7010,39 +7011,71 @@
         </p:nvSpPr>
         <p:spPr/>
         <p:txBody>
-          <a:bodyPr/>
+          <a:bodyPr>
+            <a:normAutofit fontScale="92500"/>
+          </a:bodyPr>
           <a:lstStyle/>
           <a:p>
             <a:pPr marL="0" indent="0">
               <a:buNone/>
             </a:pPr>
             <a:r>
+              <a:rPr lang="en-GB" sz="2600" dirty="0"/>
+              <a:t>current AI good at learning statistical patterns and making predictions</a:t>
+            </a:r>
+          </a:p>
+          <a:p>
+            <a:pPr marL="0" indent="0">
+              <a:buNone/>
+            </a:pPr>
+            <a:endParaRPr lang="en-GB" sz="2600" dirty="0"/>
+          </a:p>
+          <a:p>
+            <a:pPr marL="0" indent="0">
+              <a:buNone/>
+            </a:pPr>
+            <a:r>
+              <a:rPr lang="en-GB" sz="2600" dirty="0"/>
+              <a:t>but no real “understanding”, and limited reasoning and planning capabilities</a:t>
+            </a:r>
+          </a:p>
+          <a:p>
+            <a:pPr marL="0" indent="0">
+              <a:buNone/>
+            </a:pPr>
+            <a:endParaRPr lang="en-GB" sz="2600" dirty="0"/>
+          </a:p>
+          <a:p>
+            <a:pPr marL="0" indent="0">
+              <a:buNone/>
+            </a:pPr>
+            <a:r>
               <a:rPr lang="en-GB" dirty="0"/>
-              <a:t>current AI good at learning statistical patterns and making predictions</a:t>
-            </a:r>
-          </a:p>
-          <a:p>
-            <a:pPr marL="0" indent="0">
-              <a:buNone/>
-            </a:pPr>
-            <a:endParaRPr lang="en-GB" dirty="0"/>
-          </a:p>
-          <a:p>
-            <a:pPr marL="0" indent="0">
-              <a:buNone/>
-            </a:pPr>
+              <a:t>desired agent capabilities:</a:t>
+            </a:r>
+          </a:p>
+          <a:p>
             <a:r>
               <a:rPr lang="en-GB" dirty="0"/>
-              <a:t>but no real “understanding”</a:t>
-            </a:r>
-          </a:p>
-          <a:p>
-            <a:pPr marL="0" indent="0">
-              <a:buNone/>
-            </a:pPr>
+              <a:t>planning (LLM: decomposition of complex issue in multiple simple steps)</a:t>
+            </a:r>
+          </a:p>
+          <a:p>
             <a:r>
               <a:rPr lang="en-GB" dirty="0"/>
-              <a:t>and limited reasoning and planning capabilities (agency)</a:t>
+              <a:t>tool use (LLM: use predictive models for numerical/optimization tasks)</a:t>
+            </a:r>
+          </a:p>
+          <a:p>
+            <a:r>
+              <a:rPr lang="en-GB" dirty="0"/>
+              <a:t>reflection</a:t>
+            </a:r>
+          </a:p>
+          <a:p>
+            <a:r>
+              <a:rPr lang="en-GB" dirty="0"/>
+              <a:t>collaboration with other agents</a:t>
             </a:r>
           </a:p>
         </p:txBody>
@@ -7111,6 +7144,1104 @@
           <p:cNvPr id="2" name="Title 1">
             <a:extLst>
               <a:ext uri="{FF2B5EF4-FFF2-40B4-BE49-F238E27FC236}">
+                <a16:creationId xmlns:a16="http://schemas.microsoft.com/office/drawing/2014/main" id="{E11A793F-C8E0-AABA-06EF-BF5916C1A755}"/>
+              </a:ext>
+            </a:extLst>
+          </p:cNvPr>
+          <p:cNvSpPr>
+            <a:spLocks noGrp="1"/>
+          </p:cNvSpPr>
+          <p:nvPr>
+            <p:ph type="title"/>
+          </p:nvPr>
+        </p:nvSpPr>
+        <p:spPr/>
+        <p:txBody>
+          <a:bodyPr/>
+          <a:lstStyle/>
+          <a:p>
+            <a:r>
+              <a:rPr lang="en-GB" dirty="0"/>
+              <a:t>Goal: Autonomous End-to-End Workflow</a:t>
+            </a:r>
+          </a:p>
+        </p:txBody>
+      </p:sp>
+      <p:sp>
+        <p:nvSpPr>
+          <p:cNvPr id="4" name="Slide Number Placeholder 3">
+            <a:extLst>
+              <a:ext uri="{FF2B5EF4-FFF2-40B4-BE49-F238E27FC236}">
+                <a16:creationId xmlns:a16="http://schemas.microsoft.com/office/drawing/2014/main" id="{F5B1DA0A-3394-1274-5D3F-3D2BFD3C2D25}"/>
+              </a:ext>
+            </a:extLst>
+          </p:cNvPr>
+          <p:cNvSpPr>
+            <a:spLocks noGrp="1"/>
+          </p:cNvSpPr>
+          <p:nvPr>
+            <p:ph type="sldNum" sz="quarter" idx="12"/>
+          </p:nvPr>
+        </p:nvSpPr>
+        <p:spPr/>
+        <p:txBody>
+          <a:bodyPr/>
+          <a:lstStyle/>
+          <a:p>
+            <a:fld id="{CC3EA844-D84E-46D3-B34D-D5A70E978FE4}" type="slidenum">
+              <a:rPr lang="en-GB" smtClean="0"/>
+              <a:t>19</a:t>
+            </a:fld>
+            <a:endParaRPr lang="en-GB"/>
+          </a:p>
+        </p:txBody>
+      </p:sp>
+      <p:sp>
+        <p:nvSpPr>
+          <p:cNvPr id="6" name="Rectangle: Rounded Corners 3">
+            <a:extLst>
+              <a:ext uri="{FF2B5EF4-FFF2-40B4-BE49-F238E27FC236}">
+                <a16:creationId xmlns:a16="http://schemas.microsoft.com/office/drawing/2014/main" id="{2F2BF518-07A9-BED3-6560-8450C6DBE3A2}"/>
+              </a:ext>
+            </a:extLst>
+          </p:cNvPr>
+          <p:cNvSpPr/>
+          <p:nvPr/>
+        </p:nvSpPr>
+        <p:spPr>
+          <a:xfrm>
+            <a:off x="695324" y="3834677"/>
+            <a:ext cx="1808207" cy="955589"/>
+          </a:xfrm>
+          <a:prstGeom prst="roundRect">
+            <a:avLst/>
+          </a:prstGeom>
+          <a:solidFill>
+            <a:srgbClr val="EEEEEE"/>
+          </a:solidFill>
+          <a:ln w="12700" cap="flat" cmpd="sng" algn="ctr">
+            <a:noFill/>
+            <a:prstDash val="solid"/>
+            <a:miter lim="800000"/>
+          </a:ln>
+          <a:effectLst/>
+        </p:spPr>
+        <p:txBody>
+          <a:bodyPr tIns="90000" bIns="90000" rtlCol="0" anchor="t"/>
+          <a:lstStyle/>
+          <a:p>
+            <a:pPr marL="0" marR="0" lvl="0" indent="0" algn="ctr" defTabSz="914400" eaLnBrk="1" fontAlgn="auto" latinLnBrk="0" hangingPunct="1">
+              <a:lnSpc>
+                <a:spcPct val="100000"/>
+              </a:lnSpc>
+              <a:spcBef>
+                <a:spcPts val="0"/>
+              </a:spcBef>
+              <a:spcAft>
+                <a:spcPts val="600"/>
+              </a:spcAft>
+              <a:buClrTx/>
+              <a:buSzTx/>
+              <a:buFontTx/>
+              <a:buNone/>
+              <a:tabLst/>
+              <a:defRPr/>
+            </a:pPr>
+            <a:r>
+              <a:rPr kumimoji="0" lang="en-GB" sz="2400" b="0" i="0" u="none" strike="noStrike" kern="0" cap="none" spc="0" normalizeH="0" baseline="0" noProof="0">
+                <a:ln>
+                  <a:noFill/>
+                </a:ln>
+                <a:solidFill>
+                  <a:srgbClr val="000000"/>
+                </a:solidFill>
+                <a:effectLst/>
+                <a:uLnTx/>
+                <a:uFillTx/>
+                <a:latin typeface="游ゴシック Medium"/>
+                <a:ea typeface="游ゴシック Medium"/>
+                <a:cs typeface="+mn-cs"/>
+              </a:rPr>
+              <a:t>domain knowledge</a:t>
+            </a:r>
+          </a:p>
+        </p:txBody>
+      </p:sp>
+      <p:sp>
+        <p:nvSpPr>
+          <p:cNvPr id="7" name="Rectangle: Rounded Corners 4">
+            <a:extLst>
+              <a:ext uri="{FF2B5EF4-FFF2-40B4-BE49-F238E27FC236}">
+                <a16:creationId xmlns:a16="http://schemas.microsoft.com/office/drawing/2014/main" id="{9FEFB8F3-1491-ACB8-B1CC-C2FA3D36AF2D}"/>
+              </a:ext>
+            </a:extLst>
+          </p:cNvPr>
+          <p:cNvSpPr/>
+          <p:nvPr/>
+        </p:nvSpPr>
+        <p:spPr>
+          <a:xfrm>
+            <a:off x="4756965" y="1940796"/>
+            <a:ext cx="2678064" cy="604023"/>
+          </a:xfrm>
+          <a:prstGeom prst="roundRect">
+            <a:avLst/>
+          </a:prstGeom>
+          <a:solidFill>
+            <a:srgbClr val="EEEEEE"/>
+          </a:solidFill>
+          <a:ln w="12700" cap="flat" cmpd="sng" algn="ctr">
+            <a:noFill/>
+            <a:prstDash val="solid"/>
+            <a:miter lim="800000"/>
+          </a:ln>
+          <a:effectLst/>
+        </p:spPr>
+        <p:txBody>
+          <a:bodyPr tIns="90000" bIns="90000" rtlCol="0" anchor="t"/>
+          <a:lstStyle/>
+          <a:p>
+            <a:pPr marL="0" marR="0" lvl="0" indent="0" algn="ctr" defTabSz="914400" eaLnBrk="1" fontAlgn="auto" latinLnBrk="0" hangingPunct="1">
+              <a:lnSpc>
+                <a:spcPct val="100000"/>
+              </a:lnSpc>
+              <a:spcBef>
+                <a:spcPts val="0"/>
+              </a:spcBef>
+              <a:spcAft>
+                <a:spcPts val="600"/>
+              </a:spcAft>
+              <a:buClrTx/>
+              <a:buSzTx/>
+              <a:buFontTx/>
+              <a:buNone/>
+              <a:tabLst/>
+              <a:defRPr/>
+            </a:pPr>
+            <a:r>
+              <a:rPr kumimoji="0" lang="en-GB" sz="2400" b="0" i="0" u="none" strike="noStrike" kern="0" cap="none" spc="0" normalizeH="0" baseline="0" noProof="0" dirty="0">
+                <a:ln>
+                  <a:noFill/>
+                </a:ln>
+                <a:solidFill>
+                  <a:srgbClr val="000000"/>
+                </a:solidFill>
+                <a:effectLst/>
+                <a:uLnTx/>
+                <a:uFillTx/>
+                <a:latin typeface="游ゴシック Medium"/>
+                <a:ea typeface="游ゴシック Medium"/>
+                <a:cs typeface="+mn-cs"/>
+              </a:rPr>
+              <a:t>LLM/VLM agent</a:t>
+            </a:r>
+          </a:p>
+        </p:txBody>
+      </p:sp>
+      <p:sp>
+        <p:nvSpPr>
+          <p:cNvPr id="8" name="Rectangle: Rounded Corners 5">
+            <a:extLst>
+              <a:ext uri="{FF2B5EF4-FFF2-40B4-BE49-F238E27FC236}">
+                <a16:creationId xmlns:a16="http://schemas.microsoft.com/office/drawing/2014/main" id="{01F8A2ED-E962-AC35-C77A-ACD3A0F83A1C}"/>
+              </a:ext>
+            </a:extLst>
+          </p:cNvPr>
+          <p:cNvSpPr/>
+          <p:nvPr/>
+        </p:nvSpPr>
+        <p:spPr>
+          <a:xfrm>
+            <a:off x="4846516" y="3824830"/>
+            <a:ext cx="2498963" cy="955589"/>
+          </a:xfrm>
+          <a:prstGeom prst="roundRect">
+            <a:avLst/>
+          </a:prstGeom>
+          <a:solidFill>
+            <a:srgbClr val="EEEEEE"/>
+          </a:solidFill>
+          <a:ln w="12700" cap="flat" cmpd="sng" algn="ctr">
+            <a:noFill/>
+            <a:prstDash val="solid"/>
+            <a:miter lim="800000"/>
+          </a:ln>
+          <a:effectLst/>
+        </p:spPr>
+        <p:txBody>
+          <a:bodyPr tIns="90000" bIns="90000" rtlCol="0" anchor="t"/>
+          <a:lstStyle/>
+          <a:p>
+            <a:pPr marL="0" marR="0" lvl="0" indent="0" algn="ctr" defTabSz="914400" eaLnBrk="1" fontAlgn="auto" latinLnBrk="0" hangingPunct="1">
+              <a:lnSpc>
+                <a:spcPct val="100000"/>
+              </a:lnSpc>
+              <a:spcBef>
+                <a:spcPts val="0"/>
+              </a:spcBef>
+              <a:spcAft>
+                <a:spcPts val="600"/>
+              </a:spcAft>
+              <a:buClrTx/>
+              <a:buSzTx/>
+              <a:buFontTx/>
+              <a:buNone/>
+              <a:tabLst/>
+              <a:defRPr/>
+            </a:pPr>
+            <a:r>
+              <a:rPr lang="en-GB" sz="2400" kern="0" dirty="0">
+                <a:solidFill>
+                  <a:srgbClr val="000000"/>
+                </a:solidFill>
+                <a:latin typeface="游ゴシック Medium"/>
+                <a:ea typeface="游ゴシック Medium"/>
+              </a:rPr>
+              <a:t>prediction, optimization</a:t>
+            </a:r>
+            <a:endParaRPr kumimoji="0" lang="en-GB" sz="2400" b="0" i="0" u="none" strike="noStrike" kern="0" cap="none" spc="0" normalizeH="0" baseline="0" noProof="0" dirty="0">
+              <a:ln>
+                <a:noFill/>
+              </a:ln>
+              <a:solidFill>
+                <a:srgbClr val="000000"/>
+              </a:solidFill>
+              <a:effectLst/>
+              <a:uLnTx/>
+              <a:uFillTx/>
+              <a:latin typeface="游ゴシック Medium"/>
+              <a:ea typeface="游ゴシック Medium"/>
+              <a:cs typeface="+mn-cs"/>
+            </a:endParaRPr>
+          </a:p>
+        </p:txBody>
+      </p:sp>
+      <p:sp>
+        <p:nvSpPr>
+          <p:cNvPr id="9" name="Rectangle: Rounded Corners 6">
+            <a:extLst>
+              <a:ext uri="{FF2B5EF4-FFF2-40B4-BE49-F238E27FC236}">
+                <a16:creationId xmlns:a16="http://schemas.microsoft.com/office/drawing/2014/main" id="{8003EAA6-3C28-60E0-DB6E-72A6996578AE}"/>
+              </a:ext>
+            </a:extLst>
+          </p:cNvPr>
+          <p:cNvSpPr/>
+          <p:nvPr/>
+        </p:nvSpPr>
+        <p:spPr>
+          <a:xfrm>
+            <a:off x="9688467" y="3834677"/>
+            <a:ext cx="1454751" cy="955589"/>
+          </a:xfrm>
+          <a:prstGeom prst="roundRect">
+            <a:avLst/>
+          </a:prstGeom>
+          <a:solidFill>
+            <a:srgbClr val="EEEEEE"/>
+          </a:solidFill>
+          <a:ln w="12700" cap="flat" cmpd="sng" algn="ctr">
+            <a:noFill/>
+            <a:prstDash val="solid"/>
+            <a:miter lim="800000"/>
+          </a:ln>
+          <a:effectLst/>
+        </p:spPr>
+        <p:txBody>
+          <a:bodyPr tIns="90000" bIns="90000" rtlCol="0" anchor="t"/>
+          <a:lstStyle/>
+          <a:p>
+            <a:pPr marL="0" marR="0" lvl="0" indent="0" algn="ctr" defTabSz="914400" eaLnBrk="1" fontAlgn="auto" latinLnBrk="0" hangingPunct="1">
+              <a:lnSpc>
+                <a:spcPct val="100000"/>
+              </a:lnSpc>
+              <a:spcBef>
+                <a:spcPts val="0"/>
+              </a:spcBef>
+              <a:spcAft>
+                <a:spcPts val="600"/>
+              </a:spcAft>
+              <a:buClrTx/>
+              <a:buSzTx/>
+              <a:buFontTx/>
+              <a:buNone/>
+              <a:tabLst/>
+              <a:defRPr/>
+            </a:pPr>
+            <a:r>
+              <a:rPr kumimoji="0" lang="en-GB" sz="2400" b="0" i="0" u="none" strike="noStrike" kern="0" cap="none" spc="0" normalizeH="0" baseline="0" noProof="0">
+                <a:ln>
+                  <a:noFill/>
+                </a:ln>
+                <a:solidFill>
+                  <a:srgbClr val="000000"/>
+                </a:solidFill>
+                <a:effectLst/>
+                <a:uLnTx/>
+                <a:uFillTx/>
+                <a:latin typeface="游ゴシック Medium"/>
+                <a:ea typeface="游ゴシック Medium"/>
+                <a:cs typeface="+mn-cs"/>
+              </a:rPr>
+              <a:t>decision making</a:t>
+            </a:r>
+          </a:p>
+        </p:txBody>
+      </p:sp>
+      <p:sp>
+        <p:nvSpPr>
+          <p:cNvPr id="10" name="Rectangle: Rounded Corners 7">
+            <a:extLst>
+              <a:ext uri="{FF2B5EF4-FFF2-40B4-BE49-F238E27FC236}">
+                <a16:creationId xmlns:a16="http://schemas.microsoft.com/office/drawing/2014/main" id="{6924054E-8F83-0BC5-7558-3B02C5C90C2A}"/>
+              </a:ext>
+            </a:extLst>
+          </p:cNvPr>
+          <p:cNvSpPr/>
+          <p:nvPr/>
+        </p:nvSpPr>
+        <p:spPr>
+          <a:xfrm>
+            <a:off x="5214550" y="5726160"/>
+            <a:ext cx="1762897" cy="539577"/>
+          </a:xfrm>
+          <a:prstGeom prst="roundRect">
+            <a:avLst/>
+          </a:prstGeom>
+          <a:solidFill>
+            <a:srgbClr val="EEEEEE"/>
+          </a:solidFill>
+          <a:ln w="12700" cap="flat" cmpd="sng" algn="ctr">
+            <a:noFill/>
+            <a:prstDash val="solid"/>
+            <a:miter lim="800000"/>
+          </a:ln>
+          <a:effectLst/>
+        </p:spPr>
+        <p:txBody>
+          <a:bodyPr tIns="90000" bIns="90000" rtlCol="0" anchor="t"/>
+          <a:lstStyle/>
+          <a:p>
+            <a:pPr marL="0" marR="0" lvl="0" indent="0" algn="ctr" defTabSz="914400" eaLnBrk="1" fontAlgn="auto" latinLnBrk="0" hangingPunct="1">
+              <a:lnSpc>
+                <a:spcPct val="100000"/>
+              </a:lnSpc>
+              <a:spcBef>
+                <a:spcPts val="0"/>
+              </a:spcBef>
+              <a:spcAft>
+                <a:spcPts val="600"/>
+              </a:spcAft>
+              <a:buClrTx/>
+              <a:buSzTx/>
+              <a:buFontTx/>
+              <a:buNone/>
+              <a:tabLst/>
+              <a:defRPr/>
+            </a:pPr>
+            <a:r>
+              <a:rPr kumimoji="0" lang="en-GB" sz="2400" b="0" i="0" u="none" strike="noStrike" kern="0" cap="none" spc="0" normalizeH="0" baseline="0" noProof="0">
+                <a:ln>
+                  <a:noFill/>
+                </a:ln>
+                <a:solidFill>
+                  <a:srgbClr val="000000"/>
+                </a:solidFill>
+                <a:effectLst/>
+                <a:uLnTx/>
+                <a:uFillTx/>
+                <a:latin typeface="游ゴシック Medium"/>
+                <a:ea typeface="游ゴシック Medium"/>
+                <a:cs typeface="+mn-cs"/>
+              </a:rPr>
+              <a:t>perception</a:t>
+            </a:r>
+          </a:p>
+        </p:txBody>
+      </p:sp>
+      <p:cxnSp>
+        <p:nvCxnSpPr>
+          <p:cNvPr id="11" name="Straight Arrow Connector 8">
+            <a:extLst>
+              <a:ext uri="{FF2B5EF4-FFF2-40B4-BE49-F238E27FC236}">
+                <a16:creationId xmlns:a16="http://schemas.microsoft.com/office/drawing/2014/main" id="{445DD9E3-67CA-0242-7493-68440CA6EE28}"/>
+              </a:ext>
+            </a:extLst>
+          </p:cNvPr>
+          <p:cNvCxnSpPr>
+            <a:cxnSpLocks/>
+            <a:stCxn id="10" idx="1"/>
+            <a:endCxn id="6" idx="2"/>
+          </p:cNvCxnSpPr>
+          <p:nvPr/>
+        </p:nvCxnSpPr>
+        <p:spPr>
+          <a:xfrm flipH="1" flipV="1">
+            <a:off x="1599428" y="4790266"/>
+            <a:ext cx="3615122" cy="1205683"/>
+          </a:xfrm>
+          <a:prstGeom prst="straightConnector1">
+            <a:avLst/>
+          </a:prstGeom>
+          <a:noFill/>
+          <a:ln w="12700" cap="flat" cmpd="sng" algn="ctr">
+            <a:solidFill>
+              <a:srgbClr val="00B7F1"/>
+            </a:solidFill>
+            <a:prstDash val="solid"/>
+            <a:miter lim="800000"/>
+            <a:tailEnd type="triangle"/>
+          </a:ln>
+          <a:effectLst/>
+        </p:spPr>
+      </p:cxnSp>
+      <p:cxnSp>
+        <p:nvCxnSpPr>
+          <p:cNvPr id="12" name="Straight Arrow Connector 9">
+            <a:extLst>
+              <a:ext uri="{FF2B5EF4-FFF2-40B4-BE49-F238E27FC236}">
+                <a16:creationId xmlns:a16="http://schemas.microsoft.com/office/drawing/2014/main" id="{9DD17454-C864-0612-AE33-1F39D1432C7A}"/>
+              </a:ext>
+            </a:extLst>
+          </p:cNvPr>
+          <p:cNvCxnSpPr>
+            <a:cxnSpLocks/>
+            <a:stCxn id="10" idx="3"/>
+            <a:endCxn id="9" idx="2"/>
+          </p:cNvCxnSpPr>
+          <p:nvPr/>
+        </p:nvCxnSpPr>
+        <p:spPr>
+          <a:xfrm flipV="1">
+            <a:off x="6977447" y="4790266"/>
+            <a:ext cx="3438396" cy="1205683"/>
+          </a:xfrm>
+          <a:prstGeom prst="straightConnector1">
+            <a:avLst/>
+          </a:prstGeom>
+          <a:noFill/>
+          <a:ln w="12700" cap="flat" cmpd="sng" algn="ctr">
+            <a:solidFill>
+              <a:srgbClr val="00B7F1"/>
+            </a:solidFill>
+            <a:prstDash val="solid"/>
+            <a:miter lim="800000"/>
+            <a:tailEnd type="triangle"/>
+          </a:ln>
+          <a:effectLst/>
+        </p:spPr>
+      </p:cxnSp>
+      <p:cxnSp>
+        <p:nvCxnSpPr>
+          <p:cNvPr id="13" name="Straight Arrow Connector 10">
+            <a:extLst>
+              <a:ext uri="{FF2B5EF4-FFF2-40B4-BE49-F238E27FC236}">
+                <a16:creationId xmlns:a16="http://schemas.microsoft.com/office/drawing/2014/main" id="{BAC7DCF3-924D-7ACC-EE4E-847BFD48E622}"/>
+              </a:ext>
+            </a:extLst>
+          </p:cNvPr>
+          <p:cNvCxnSpPr>
+            <a:cxnSpLocks/>
+            <a:stCxn id="6" idx="0"/>
+            <a:endCxn id="7" idx="1"/>
+          </p:cNvCxnSpPr>
+          <p:nvPr/>
+        </p:nvCxnSpPr>
+        <p:spPr>
+          <a:xfrm flipV="1">
+            <a:off x="1599428" y="2242808"/>
+            <a:ext cx="3157537" cy="1591869"/>
+          </a:xfrm>
+          <a:prstGeom prst="straightConnector1">
+            <a:avLst/>
+          </a:prstGeom>
+          <a:noFill/>
+          <a:ln w="12700" cap="flat" cmpd="sng" algn="ctr">
+            <a:solidFill>
+              <a:srgbClr val="00B7F1"/>
+            </a:solidFill>
+            <a:prstDash val="solid"/>
+            <a:miter lim="800000"/>
+            <a:tailEnd type="triangle"/>
+          </a:ln>
+          <a:effectLst/>
+        </p:spPr>
+      </p:cxnSp>
+      <p:sp>
+        <p:nvSpPr>
+          <p:cNvPr id="14" name="TextBox 11">
+            <a:extLst>
+              <a:ext uri="{FF2B5EF4-FFF2-40B4-BE49-F238E27FC236}">
+                <a16:creationId xmlns:a16="http://schemas.microsoft.com/office/drawing/2014/main" id="{B44A87B9-60FC-D03A-E54D-BA7AB01ED288}"/>
+              </a:ext>
+            </a:extLst>
+          </p:cNvPr>
+          <p:cNvSpPr txBox="1"/>
+          <p:nvPr/>
+        </p:nvSpPr>
+        <p:spPr>
+          <a:xfrm>
+            <a:off x="2675058" y="3148177"/>
+            <a:ext cx="811441" cy="551090"/>
+          </a:xfrm>
+          <a:prstGeom prst="rect">
+            <a:avLst/>
+          </a:prstGeom>
+          <a:noFill/>
+        </p:spPr>
+        <p:txBody>
+          <a:bodyPr wrap="none" tIns="90000" bIns="90000" rtlCol="0">
+            <a:spAutoFit/>
+          </a:bodyPr>
+          <a:lstStyle/>
+          <a:p>
+            <a:pPr>
+              <a:spcAft>
+                <a:spcPts val="600"/>
+              </a:spcAft>
+            </a:pPr>
+            <a:r>
+              <a:rPr lang="en-GB" sz="2400" dirty="0">
+                <a:solidFill>
+                  <a:srgbClr val="000000"/>
+                </a:solidFill>
+                <a:latin typeface="游ゴシック Medium"/>
+              </a:rPr>
+              <a:t>RAG</a:t>
+            </a:r>
+          </a:p>
+        </p:txBody>
+      </p:sp>
+      <p:cxnSp>
+        <p:nvCxnSpPr>
+          <p:cNvPr id="15" name="Straight Arrow Connector 12">
+            <a:extLst>
+              <a:ext uri="{FF2B5EF4-FFF2-40B4-BE49-F238E27FC236}">
+                <a16:creationId xmlns:a16="http://schemas.microsoft.com/office/drawing/2014/main" id="{3EB9ABF8-9E31-3CC5-6EDD-0B0CA9E317FB}"/>
+              </a:ext>
+            </a:extLst>
+          </p:cNvPr>
+          <p:cNvCxnSpPr>
+            <a:cxnSpLocks/>
+            <a:stCxn id="8" idx="0"/>
+            <a:endCxn id="7" idx="2"/>
+          </p:cNvCxnSpPr>
+          <p:nvPr/>
+        </p:nvCxnSpPr>
+        <p:spPr>
+          <a:xfrm flipH="1" flipV="1">
+            <a:off x="6095997" y="2544819"/>
+            <a:ext cx="1" cy="1280011"/>
+          </a:xfrm>
+          <a:prstGeom prst="straightConnector1">
+            <a:avLst/>
+          </a:prstGeom>
+          <a:noFill/>
+          <a:ln w="12700" cap="flat" cmpd="sng" algn="ctr">
+            <a:solidFill>
+              <a:srgbClr val="00B7F1"/>
+            </a:solidFill>
+            <a:prstDash val="solid"/>
+            <a:miter lim="800000"/>
+            <a:tailEnd type="triangle"/>
+          </a:ln>
+          <a:effectLst/>
+        </p:spPr>
+      </p:cxnSp>
+      <p:cxnSp>
+        <p:nvCxnSpPr>
+          <p:cNvPr id="16" name="Straight Arrow Connector 13">
+            <a:extLst>
+              <a:ext uri="{FF2B5EF4-FFF2-40B4-BE49-F238E27FC236}">
+                <a16:creationId xmlns:a16="http://schemas.microsoft.com/office/drawing/2014/main" id="{D8A3BD67-1B65-A31B-58E4-E93E3FDE7373}"/>
+              </a:ext>
+            </a:extLst>
+          </p:cNvPr>
+          <p:cNvCxnSpPr>
+            <a:cxnSpLocks/>
+            <a:stCxn id="7" idx="3"/>
+            <a:endCxn id="9" idx="0"/>
+          </p:cNvCxnSpPr>
+          <p:nvPr/>
+        </p:nvCxnSpPr>
+        <p:spPr>
+          <a:xfrm>
+            <a:off x="7435029" y="2242808"/>
+            <a:ext cx="2980814" cy="1591869"/>
+          </a:xfrm>
+          <a:prstGeom prst="straightConnector1">
+            <a:avLst/>
+          </a:prstGeom>
+          <a:noFill/>
+          <a:ln w="12700" cap="flat" cmpd="sng" algn="ctr">
+            <a:solidFill>
+              <a:srgbClr val="00B7F1"/>
+            </a:solidFill>
+            <a:prstDash val="solid"/>
+            <a:miter lim="800000"/>
+            <a:tailEnd type="triangle"/>
+          </a:ln>
+          <a:effectLst/>
+        </p:spPr>
+      </p:cxnSp>
+      <p:sp>
+        <p:nvSpPr>
+          <p:cNvPr id="17" name="TextBox 14">
+            <a:extLst>
+              <a:ext uri="{FF2B5EF4-FFF2-40B4-BE49-F238E27FC236}">
+                <a16:creationId xmlns:a16="http://schemas.microsoft.com/office/drawing/2014/main" id="{49E8EA8B-2736-A0C1-5132-3856F4EC14D4}"/>
+              </a:ext>
+            </a:extLst>
+          </p:cNvPr>
+          <p:cNvSpPr txBox="1"/>
+          <p:nvPr/>
+        </p:nvSpPr>
+        <p:spPr>
+          <a:xfrm>
+            <a:off x="5416640" y="3050446"/>
+            <a:ext cx="1648208" cy="551090"/>
+          </a:xfrm>
+          <a:prstGeom prst="rect">
+            <a:avLst/>
+          </a:prstGeom>
+          <a:noFill/>
+        </p:spPr>
+        <p:txBody>
+          <a:bodyPr wrap="none" tIns="90000" bIns="90000" rtlCol="0">
+            <a:spAutoFit/>
+          </a:bodyPr>
+          <a:lstStyle/>
+          <a:p>
+            <a:pPr>
+              <a:spcAft>
+                <a:spcPts val="600"/>
+              </a:spcAft>
+            </a:pPr>
+            <a:r>
+              <a:rPr lang="en-GB" sz="2400" dirty="0">
+                <a:solidFill>
+                  <a:srgbClr val="000000"/>
+                </a:solidFill>
+                <a:latin typeface="游ゴシック Medium"/>
+              </a:rPr>
+              <a:t>tool usage</a:t>
+            </a:r>
+          </a:p>
+        </p:txBody>
+      </p:sp>
+      <p:sp>
+        <p:nvSpPr>
+          <p:cNvPr id="18" name="TextBox 15">
+            <a:extLst>
+              <a:ext uri="{FF2B5EF4-FFF2-40B4-BE49-F238E27FC236}">
+                <a16:creationId xmlns:a16="http://schemas.microsoft.com/office/drawing/2014/main" id="{9EA84B78-F0E6-D602-EFD6-4ACE12E34908}"/>
+              </a:ext>
+            </a:extLst>
+          </p:cNvPr>
+          <p:cNvSpPr txBox="1"/>
+          <p:nvPr/>
+        </p:nvSpPr>
+        <p:spPr>
+          <a:xfrm>
+            <a:off x="9832188" y="3050446"/>
+            <a:ext cx="1167307" cy="551090"/>
+          </a:xfrm>
+          <a:prstGeom prst="rect">
+            <a:avLst/>
+          </a:prstGeom>
+          <a:noFill/>
+        </p:spPr>
+        <p:txBody>
+          <a:bodyPr wrap="none" tIns="90000" bIns="90000" rtlCol="0">
+            <a:spAutoFit/>
+          </a:bodyPr>
+          <a:lstStyle/>
+          <a:p>
+            <a:pPr>
+              <a:spcAft>
+                <a:spcPts val="600"/>
+              </a:spcAft>
+            </a:pPr>
+            <a:r>
+              <a:rPr lang="en-GB" sz="2400">
+                <a:solidFill>
+                  <a:srgbClr val="000000"/>
+                </a:solidFill>
+                <a:latin typeface="游ゴシック Medium"/>
+              </a:rPr>
+              <a:t>control</a:t>
+            </a:r>
+          </a:p>
+        </p:txBody>
+      </p:sp>
+      <p:sp>
+        <p:nvSpPr>
+          <p:cNvPr id="19" name="TextBox 26">
+            <a:extLst>
+              <a:ext uri="{FF2B5EF4-FFF2-40B4-BE49-F238E27FC236}">
+                <a16:creationId xmlns:a16="http://schemas.microsoft.com/office/drawing/2014/main" id="{CA4DEEFE-6684-8CD5-E3F1-184373D0975C}"/>
+              </a:ext>
+            </a:extLst>
+          </p:cNvPr>
+          <p:cNvSpPr txBox="1"/>
+          <p:nvPr/>
+        </p:nvSpPr>
+        <p:spPr>
+          <a:xfrm>
+            <a:off x="2503531" y="5393107"/>
+            <a:ext cx="907621" cy="551090"/>
+          </a:xfrm>
+          <a:prstGeom prst="rect">
+            <a:avLst/>
+          </a:prstGeom>
+          <a:noFill/>
+        </p:spPr>
+        <p:txBody>
+          <a:bodyPr wrap="none" tIns="90000" bIns="90000" rtlCol="0">
+            <a:spAutoFit/>
+          </a:bodyPr>
+          <a:lstStyle/>
+          <a:p>
+            <a:pPr>
+              <a:spcAft>
+                <a:spcPts val="600"/>
+              </a:spcAft>
+            </a:pPr>
+            <a:r>
+              <a:rPr lang="en-GB" sz="2400" dirty="0">
+                <a:solidFill>
+                  <a:srgbClr val="000000"/>
+                </a:solidFill>
+                <a:latin typeface="游ゴシック Medium"/>
+              </a:rPr>
+              <a:t>input</a:t>
+            </a:r>
+          </a:p>
+        </p:txBody>
+      </p:sp>
+      <p:sp>
+        <p:nvSpPr>
+          <p:cNvPr id="20" name="TextBox 27">
+            <a:extLst>
+              <a:ext uri="{FF2B5EF4-FFF2-40B4-BE49-F238E27FC236}">
+                <a16:creationId xmlns:a16="http://schemas.microsoft.com/office/drawing/2014/main" id="{BF1ACE61-3336-BEB1-3010-893B4093EC2C}"/>
+              </a:ext>
+            </a:extLst>
+          </p:cNvPr>
+          <p:cNvSpPr txBox="1"/>
+          <p:nvPr/>
+        </p:nvSpPr>
+        <p:spPr>
+          <a:xfrm>
+            <a:off x="8441358" y="5393107"/>
+            <a:ext cx="907621" cy="551090"/>
+          </a:xfrm>
+          <a:prstGeom prst="rect">
+            <a:avLst/>
+          </a:prstGeom>
+          <a:noFill/>
+        </p:spPr>
+        <p:txBody>
+          <a:bodyPr wrap="none" tIns="90000" bIns="90000" rtlCol="0">
+            <a:spAutoFit/>
+          </a:bodyPr>
+          <a:lstStyle/>
+          <a:p>
+            <a:pPr>
+              <a:spcAft>
+                <a:spcPts val="600"/>
+              </a:spcAft>
+            </a:pPr>
+            <a:r>
+              <a:rPr lang="en-GB" sz="2400" dirty="0">
+                <a:solidFill>
+                  <a:srgbClr val="000000"/>
+                </a:solidFill>
+                <a:latin typeface="游ゴシック Medium"/>
+              </a:rPr>
+              <a:t>input</a:t>
+            </a:r>
+          </a:p>
+        </p:txBody>
+      </p:sp>
+      <p:cxnSp>
+        <p:nvCxnSpPr>
+          <p:cNvPr id="21" name="Straight Arrow Connector 31">
+            <a:extLst>
+              <a:ext uri="{FF2B5EF4-FFF2-40B4-BE49-F238E27FC236}">
+                <a16:creationId xmlns:a16="http://schemas.microsoft.com/office/drawing/2014/main" id="{B8011727-3418-FD68-02B0-1455C5636B4E}"/>
+              </a:ext>
+            </a:extLst>
+          </p:cNvPr>
+          <p:cNvCxnSpPr>
+            <a:cxnSpLocks/>
+            <a:stCxn id="6" idx="3"/>
+            <a:endCxn id="8" idx="1"/>
+          </p:cNvCxnSpPr>
+          <p:nvPr/>
+        </p:nvCxnSpPr>
+        <p:spPr>
+          <a:xfrm flipV="1">
+            <a:off x="2503531" y="4302625"/>
+            <a:ext cx="2342985" cy="9847"/>
+          </a:xfrm>
+          <a:prstGeom prst="straightConnector1">
+            <a:avLst/>
+          </a:prstGeom>
+          <a:noFill/>
+          <a:ln w="12700" cap="flat" cmpd="sng" algn="ctr">
+            <a:solidFill>
+              <a:srgbClr val="00B7F1"/>
+            </a:solidFill>
+            <a:prstDash val="solid"/>
+            <a:miter lim="800000"/>
+            <a:headEnd type="triangle"/>
+            <a:tailEnd type="triangle"/>
+          </a:ln>
+          <a:effectLst/>
+        </p:spPr>
+      </p:cxnSp>
+    </p:spTree>
+    <p:extLst>
+      <p:ext uri="{BB962C8B-B14F-4D97-AF65-F5344CB8AC3E}">
+        <p14:creationId xmlns:p14="http://schemas.microsoft.com/office/powerpoint/2010/main" val="3642987199"/>
+      </p:ext>
+    </p:extLst>
+  </p:cSld>
+  <p:clrMapOvr>
+    <a:masterClrMapping/>
+  </p:clrMapOvr>
+</p:sld>
+</file>
+
+<file path=ppt/slides/slide2.xml><?xml version="1.0" encoding="utf-8"?>
+<p:sld xmlns:a="http://schemas.openxmlformats.org/drawingml/2006/main" xmlns:r="http://schemas.openxmlformats.org/officeDocument/2006/relationships" xmlns:p="http://schemas.openxmlformats.org/presentationml/2006/main">
+  <p:cSld>
+    <p:spTree>
+      <p:nvGrpSpPr>
+        <p:cNvPr id="1" name=""/>
+        <p:cNvGrpSpPr/>
+        <p:nvPr/>
+      </p:nvGrpSpPr>
+      <p:grpSpPr>
+        <a:xfrm>
+          <a:off x="0" y="0"/>
+          <a:ext cx="0" cy="0"/>
+          <a:chOff x="0" y="0"/>
+          <a:chExt cx="0" cy="0"/>
+        </a:xfrm>
+      </p:grpSpPr>
+      <p:sp>
+        <p:nvSpPr>
+          <p:cNvPr id="6" name="Title 5">
+            <a:extLst>
+              <a:ext uri="{FF2B5EF4-FFF2-40B4-BE49-F238E27FC236}">
+                <a16:creationId xmlns:a16="http://schemas.microsoft.com/office/drawing/2014/main" id="{A6D4E78A-896B-C79A-E2FE-5D9193754C31}"/>
+              </a:ext>
+            </a:extLst>
+          </p:cNvPr>
+          <p:cNvSpPr>
+            <a:spLocks noGrp="1"/>
+          </p:cNvSpPr>
+          <p:nvPr>
+            <p:ph type="title"/>
+          </p:nvPr>
+        </p:nvSpPr>
+        <p:spPr/>
+        <p:txBody>
+          <a:bodyPr/>
+          <a:lstStyle/>
+          <a:p>
+            <a:r>
+              <a:rPr lang="en-GB" dirty="0"/>
+              <a:t>Modern Language Models in a Nutshell</a:t>
+            </a:r>
+          </a:p>
+        </p:txBody>
+      </p:sp>
+      <p:sp>
+        <p:nvSpPr>
+          <p:cNvPr id="7" name="Content Placeholder 6">
+            <a:extLst>
+              <a:ext uri="{FF2B5EF4-FFF2-40B4-BE49-F238E27FC236}">
+                <a16:creationId xmlns:a16="http://schemas.microsoft.com/office/drawing/2014/main" id="{E908D6CC-B86F-1636-6F85-AB0B7A2A316F}"/>
+              </a:ext>
+            </a:extLst>
+          </p:cNvPr>
+          <p:cNvSpPr>
+            <a:spLocks noGrp="1"/>
+          </p:cNvSpPr>
+          <p:nvPr>
+            <p:ph idx="1"/>
+          </p:nvPr>
+        </p:nvSpPr>
+        <p:spPr/>
+        <p:txBody>
+          <a:bodyPr/>
+          <a:lstStyle/>
+          <a:p>
+            <a:r>
+              <a:rPr lang="en-GB" dirty="0"/>
+              <a:t>self-supervised learning: e.g., next-word prediction</a:t>
+            </a:r>
+          </a:p>
+          <a:p>
+            <a:r>
+              <a:rPr lang="en-GB" dirty="0"/>
+              <a:t>tokenization: split text into chunks (e.g., words)</a:t>
+            </a:r>
+          </a:p>
+          <a:p>
+            <a:r>
+              <a:rPr lang="en-GB" dirty="0"/>
+              <a:t>semantics by means of vector embeddings: e.g., via bag-of-words (or end-to-end in transformer)</a:t>
+            </a:r>
+          </a:p>
+          <a:p>
+            <a:r>
+              <a:rPr lang="en-GB" dirty="0"/>
+              <a:t>positional encoding &amp; embeddings: order of sequence</a:t>
+            </a:r>
+          </a:p>
+          <a:p>
+            <a:r>
+              <a:rPr lang="en-GB" dirty="0"/>
+              <a:t>contextual embeddings: (self-)attention (weighted averages: influence from other tokens)</a:t>
+            </a:r>
+          </a:p>
+        </p:txBody>
+      </p:sp>
+      <p:sp>
+        <p:nvSpPr>
+          <p:cNvPr id="5" name="Slide Number Placeholder 4">
+            <a:extLst>
+              <a:ext uri="{FF2B5EF4-FFF2-40B4-BE49-F238E27FC236}">
+                <a16:creationId xmlns:a16="http://schemas.microsoft.com/office/drawing/2014/main" id="{4E568FCF-2CF1-B3CF-F33E-FD3F880A8519}"/>
+              </a:ext>
+            </a:extLst>
+          </p:cNvPr>
+          <p:cNvSpPr>
+            <a:spLocks noGrp="1"/>
+          </p:cNvSpPr>
+          <p:nvPr>
+            <p:ph type="sldNum" sz="quarter" idx="12"/>
+          </p:nvPr>
+        </p:nvSpPr>
+        <p:spPr/>
+        <p:txBody>
+          <a:bodyPr/>
+          <a:lstStyle/>
+          <a:p>
+            <a:fld id="{849D05A8-43E9-1C49-8606-50AB68220DEC}" type="slidenum">
+              <a:rPr lang="en-DE" smtClean="0"/>
+              <a:t>2</a:t>
+            </a:fld>
+            <a:endParaRPr lang="en-DE"/>
+          </a:p>
+        </p:txBody>
+      </p:sp>
+      <p:pic>
+        <p:nvPicPr>
+          <p:cNvPr id="9" name="Picture 8">
+            <a:extLst>
+              <a:ext uri="{FF2B5EF4-FFF2-40B4-BE49-F238E27FC236}">
+                <a16:creationId xmlns:a16="http://schemas.microsoft.com/office/drawing/2014/main" id="{9CF13535-25F6-2D2D-CF2E-13506BC8DAB4}"/>
+              </a:ext>
+            </a:extLst>
+          </p:cNvPr>
+          <p:cNvPicPr>
+            <a:picLocks noChangeAspect="1"/>
+          </p:cNvPicPr>
+          <p:nvPr/>
+        </p:nvPicPr>
+        <p:blipFill>
+          <a:blip r:embed="rId2"/>
+          <a:stretch>
+            <a:fillRect/>
+          </a:stretch>
+        </p:blipFill>
+        <p:spPr>
+          <a:xfrm>
+            <a:off x="4365780" y="4898321"/>
+            <a:ext cx="6149820" cy="1594554"/>
+          </a:xfrm>
+          <a:prstGeom prst="rect">
+            <a:avLst/>
+          </a:prstGeom>
+        </p:spPr>
+      </p:pic>
+      <p:sp>
+        <p:nvSpPr>
+          <p:cNvPr id="10" name="TextBox 9">
+            <a:extLst>
+              <a:ext uri="{FF2B5EF4-FFF2-40B4-BE49-F238E27FC236}">
+                <a16:creationId xmlns:a16="http://schemas.microsoft.com/office/drawing/2014/main" id="{19055624-1DDD-A961-E47A-09FB20A316B6}"/>
+              </a:ext>
+            </a:extLst>
+          </p:cNvPr>
+          <p:cNvSpPr txBox="1"/>
+          <p:nvPr/>
+        </p:nvSpPr>
+        <p:spPr>
+          <a:xfrm>
+            <a:off x="8766496" y="6369764"/>
+            <a:ext cx="532518" cy="246221"/>
+          </a:xfrm>
+          <a:prstGeom prst="rect">
+            <a:avLst/>
+          </a:prstGeom>
+          <a:noFill/>
+        </p:spPr>
+        <p:txBody>
+          <a:bodyPr wrap="none" rtlCol="0">
+            <a:spAutoFit/>
+          </a:bodyPr>
+          <a:lstStyle/>
+          <a:p>
+            <a:r>
+              <a:rPr lang="de-DE" sz="1000" dirty="0">
+                <a:hlinkClick r:id="rId3"/>
+              </a:rPr>
+              <a:t>source</a:t>
+            </a:r>
+            <a:endParaRPr lang="de-DE" sz="1000" dirty="0"/>
+          </a:p>
+        </p:txBody>
+      </p:sp>
+    </p:spTree>
+    <p:extLst>
+      <p:ext uri="{BB962C8B-B14F-4D97-AF65-F5344CB8AC3E}">
+        <p14:creationId xmlns:p14="http://schemas.microsoft.com/office/powerpoint/2010/main" val="1658142472"/>
+      </p:ext>
+    </p:extLst>
+  </p:cSld>
+  <p:clrMapOvr>
+    <a:masterClrMapping/>
+  </p:clrMapOvr>
+</p:sld>
+</file>
+
+<file path=ppt/slides/slide20.xml><?xml version="1.0" encoding="utf-8"?>
+<p:sld xmlns:a="http://schemas.openxmlformats.org/drawingml/2006/main" xmlns:r="http://schemas.openxmlformats.org/officeDocument/2006/relationships" xmlns:p="http://schemas.openxmlformats.org/presentationml/2006/main">
+  <p:cSld>
+    <p:spTree>
+      <p:nvGrpSpPr>
+        <p:cNvPr id="1" name=""/>
+        <p:cNvGrpSpPr/>
+        <p:nvPr/>
+      </p:nvGrpSpPr>
+      <p:grpSpPr>
+        <a:xfrm>
+          <a:off x="0" y="0"/>
+          <a:ext cx="0" cy="0"/>
+          <a:chOff x="0" y="0"/>
+          <a:chExt cx="0" cy="0"/>
+        </a:xfrm>
+      </p:grpSpPr>
+      <p:sp>
+        <p:nvSpPr>
+          <p:cNvPr id="2" name="Title 1">
+            <a:extLst>
+              <a:ext uri="{FF2B5EF4-FFF2-40B4-BE49-F238E27FC236}">
                 <a16:creationId xmlns:a16="http://schemas.microsoft.com/office/drawing/2014/main" id="{E489E988-5EB3-BD0F-E8D5-B9C538113404}"/>
               </a:ext>
             </a:extLst>
@@ -7162,7 +8293,7 @@
           <a:p>
             <a:fld id="{849D05A8-43E9-1C49-8606-50AB68220DEC}" type="slidenum">
               <a:rPr lang="en-DE" smtClean="0"/>
-              <a:t>19</a:t>
+              <a:t>20</a:t>
             </a:fld>
             <a:endParaRPr lang="en-DE"/>
           </a:p>
@@ -7681,7 +8812,7 @@
 </p:sld>
 </file>
 
-<file path=ppt/slides/slide2.xml><?xml version="1.0" encoding="utf-8"?>
+<file path=ppt/slides/slide21.xml><?xml version="1.0" encoding="utf-8"?>
 <p:sld xmlns:a="http://schemas.openxmlformats.org/drawingml/2006/main" xmlns:r="http://schemas.openxmlformats.org/officeDocument/2006/relationships" xmlns:p="http://schemas.openxmlformats.org/presentationml/2006/main">
   <p:cSld>
     <p:spTree>
@@ -7700,213 +8831,6 @@
       </p:grpSpPr>
       <p:sp>
         <p:nvSpPr>
-          <p:cNvPr id="6" name="Title 5">
-            <a:extLst>
-              <a:ext uri="{FF2B5EF4-FFF2-40B4-BE49-F238E27FC236}">
-                <a16:creationId xmlns:a16="http://schemas.microsoft.com/office/drawing/2014/main" id="{A6D4E78A-896B-C79A-E2FE-5D9193754C31}"/>
-              </a:ext>
-            </a:extLst>
-          </p:cNvPr>
-          <p:cNvSpPr>
-            <a:spLocks noGrp="1"/>
-          </p:cNvSpPr>
-          <p:nvPr>
-            <p:ph type="title"/>
-          </p:nvPr>
-        </p:nvSpPr>
-        <p:spPr/>
-        <p:txBody>
-          <a:bodyPr/>
-          <a:lstStyle/>
-          <a:p>
-            <a:r>
-              <a:rPr lang="en-GB" dirty="0"/>
-              <a:t>Modern Language Models in a Nutshell</a:t>
-            </a:r>
-          </a:p>
-        </p:txBody>
-      </p:sp>
-      <p:sp>
-        <p:nvSpPr>
-          <p:cNvPr id="7" name="Content Placeholder 6">
-            <a:extLst>
-              <a:ext uri="{FF2B5EF4-FFF2-40B4-BE49-F238E27FC236}">
-                <a16:creationId xmlns:a16="http://schemas.microsoft.com/office/drawing/2014/main" id="{E908D6CC-B86F-1636-6F85-AB0B7A2A316F}"/>
-              </a:ext>
-            </a:extLst>
-          </p:cNvPr>
-          <p:cNvSpPr>
-            <a:spLocks noGrp="1"/>
-          </p:cNvSpPr>
-          <p:nvPr>
-            <p:ph idx="1"/>
-          </p:nvPr>
-        </p:nvSpPr>
-        <p:spPr/>
-        <p:txBody>
-          <a:bodyPr/>
-          <a:lstStyle/>
-          <a:p>
-            <a:r>
-              <a:rPr lang="en-GB" dirty="0"/>
-              <a:t>self-supervised learning: e.g., next-word prediction</a:t>
-            </a:r>
-          </a:p>
-          <a:p>
-            <a:r>
-              <a:rPr lang="en-GB" dirty="0"/>
-              <a:t>tokenization: split text into chunks (e.g., words)</a:t>
-            </a:r>
-          </a:p>
-          <a:p>
-            <a:r>
-              <a:rPr lang="en-GB" dirty="0"/>
-              <a:t>semantics by means of vector embeddings: e.g., via bag-of-words (or end-to-end in transformer)</a:t>
-            </a:r>
-          </a:p>
-          <a:p>
-            <a:r>
-              <a:rPr lang="en-GB" dirty="0"/>
-              <a:t>positional encoding &amp; embeddings: order of sequence</a:t>
-            </a:r>
-          </a:p>
-          <a:p>
-            <a:r>
-              <a:rPr lang="en-GB" dirty="0"/>
-              <a:t>contextual embeddings: (self-)attention (weighted averages: influence from other tokens)</a:t>
-            </a:r>
-          </a:p>
-        </p:txBody>
-      </p:sp>
-      <p:sp>
-        <p:nvSpPr>
-          <p:cNvPr id="5" name="Slide Number Placeholder 4">
-            <a:extLst>
-              <a:ext uri="{FF2B5EF4-FFF2-40B4-BE49-F238E27FC236}">
-                <a16:creationId xmlns:a16="http://schemas.microsoft.com/office/drawing/2014/main" id="{4E568FCF-2CF1-B3CF-F33E-FD3F880A8519}"/>
-              </a:ext>
-            </a:extLst>
-          </p:cNvPr>
-          <p:cNvSpPr>
-            <a:spLocks noGrp="1"/>
-          </p:cNvSpPr>
-          <p:nvPr>
-            <p:ph type="sldNum" sz="quarter" idx="12"/>
-          </p:nvPr>
-        </p:nvSpPr>
-        <p:spPr/>
-        <p:txBody>
-          <a:bodyPr/>
-          <a:lstStyle/>
-          <a:p>
-            <a:fld id="{849D05A8-43E9-1C49-8606-50AB68220DEC}" type="slidenum">
-              <a:rPr lang="en-DE" smtClean="0"/>
-              <a:t>2</a:t>
-            </a:fld>
-            <a:endParaRPr lang="en-DE"/>
-          </a:p>
-        </p:txBody>
-      </p:sp>
-      <p:pic>
-        <p:nvPicPr>
-          <p:cNvPr id="9" name="Picture 8">
-            <a:extLst>
-              <a:ext uri="{FF2B5EF4-FFF2-40B4-BE49-F238E27FC236}">
-                <a16:creationId xmlns:a16="http://schemas.microsoft.com/office/drawing/2014/main" id="{9CF13535-25F6-2D2D-CF2E-13506BC8DAB4}"/>
-              </a:ext>
-            </a:extLst>
-          </p:cNvPr>
-          <p:cNvPicPr>
-            <a:picLocks noChangeAspect="1"/>
-          </p:cNvPicPr>
-          <p:nvPr/>
-        </p:nvPicPr>
-        <p:blipFill>
-          <a:blip r:embed="rId2"/>
-          <a:stretch>
-            <a:fillRect/>
-          </a:stretch>
-        </p:blipFill>
-        <p:spPr>
-          <a:xfrm>
-            <a:off x="4365780" y="4898321"/>
-            <a:ext cx="6149820" cy="1594554"/>
-          </a:xfrm>
-          <a:prstGeom prst="rect">
-            <a:avLst/>
-          </a:prstGeom>
-        </p:spPr>
-      </p:pic>
-      <p:sp>
-        <p:nvSpPr>
-          <p:cNvPr id="10" name="TextBox 9">
-            <a:extLst>
-              <a:ext uri="{FF2B5EF4-FFF2-40B4-BE49-F238E27FC236}">
-                <a16:creationId xmlns:a16="http://schemas.microsoft.com/office/drawing/2014/main" id="{19055624-1DDD-A961-E47A-09FB20A316B6}"/>
-              </a:ext>
-            </a:extLst>
-          </p:cNvPr>
-          <p:cNvSpPr txBox="1"/>
-          <p:nvPr/>
-        </p:nvSpPr>
-        <p:spPr>
-          <a:xfrm>
-            <a:off x="8766496" y="6369764"/>
-            <a:ext cx="532518" cy="246221"/>
-          </a:xfrm>
-          <a:prstGeom prst="rect">
-            <a:avLst/>
-          </a:prstGeom>
-          <a:noFill/>
-        </p:spPr>
-        <p:txBody>
-          <a:bodyPr wrap="none" rtlCol="0">
-            <a:spAutoFit/>
-          </a:bodyPr>
-          <a:lstStyle/>
-          <a:p>
-            <a:r>
-              <a:rPr lang="de-DE" sz="1000" dirty="0">
-                <a:hlinkClick r:id="rId3"/>
-              </a:rPr>
-              <a:t>source</a:t>
-            </a:r>
-            <a:endParaRPr lang="de-DE" sz="1000" dirty="0"/>
-          </a:p>
-        </p:txBody>
-      </p:sp>
-    </p:spTree>
-    <p:extLst>
-      <p:ext uri="{BB962C8B-B14F-4D97-AF65-F5344CB8AC3E}">
-        <p14:creationId xmlns:p14="http://schemas.microsoft.com/office/powerpoint/2010/main" val="1658142472"/>
-      </p:ext>
-    </p:extLst>
-  </p:cSld>
-  <p:clrMapOvr>
-    <a:masterClrMapping/>
-  </p:clrMapOvr>
-</p:sld>
-</file>
-
-<file path=ppt/slides/slide20.xml><?xml version="1.0" encoding="utf-8"?>
-<p:sld xmlns:a="http://schemas.openxmlformats.org/drawingml/2006/main" xmlns:r="http://schemas.openxmlformats.org/officeDocument/2006/relationships" xmlns:p="http://schemas.openxmlformats.org/presentationml/2006/main">
-  <p:cSld>
-    <p:spTree>
-      <p:nvGrpSpPr>
-        <p:cNvPr id="1" name=""/>
-        <p:cNvGrpSpPr/>
-        <p:nvPr/>
-      </p:nvGrpSpPr>
-      <p:grpSpPr>
-        <a:xfrm>
-          <a:off x="0" y="0"/>
-          <a:ext cx="0" cy="0"/>
-          <a:chOff x="0" y="0"/>
-          <a:chExt cx="0" cy="0"/>
-        </a:xfrm>
-      </p:grpSpPr>
-      <p:sp>
-        <p:nvSpPr>
           <p:cNvPr id="2" name="Title 1">
             <a:extLst>
               <a:ext uri="{FF2B5EF4-FFF2-40B4-BE49-F238E27FC236}">
@@ -8045,7 +8969,7 @@
           <a:p>
             <a:fld id="{849D05A8-43E9-1C49-8606-50AB68220DEC}" type="slidenum">
               <a:rPr lang="en-DE" smtClean="0"/>
-              <a:t>20</a:t>
+              <a:t>21</a:t>
             </a:fld>
             <a:endParaRPr lang="en-DE"/>
           </a:p>
@@ -8191,175 +9115,6 @@
     <p:extLst>
       <p:ext uri="{BB962C8B-B14F-4D97-AF65-F5344CB8AC3E}">
         <p14:creationId xmlns:p14="http://schemas.microsoft.com/office/powerpoint/2010/main" val="454211426"/>
-      </p:ext>
-    </p:extLst>
-  </p:cSld>
-  <p:clrMapOvr>
-    <a:masterClrMapping/>
-  </p:clrMapOvr>
-</p:sld>
-</file>
-
-<file path=ppt/slides/slide21.xml><?xml version="1.0" encoding="utf-8"?>
-<p:sld xmlns:a="http://schemas.openxmlformats.org/drawingml/2006/main" xmlns:r="http://schemas.openxmlformats.org/officeDocument/2006/relationships" xmlns:p="http://schemas.openxmlformats.org/presentationml/2006/main">
-  <p:cSld>
-    <p:spTree>
-      <p:nvGrpSpPr>
-        <p:cNvPr id="1" name=""/>
-        <p:cNvGrpSpPr/>
-        <p:nvPr/>
-      </p:nvGrpSpPr>
-      <p:grpSpPr>
-        <a:xfrm>
-          <a:off x="0" y="0"/>
-          <a:ext cx="0" cy="0"/>
-          <a:chOff x="0" y="0"/>
-          <a:chExt cx="0" cy="0"/>
-        </a:xfrm>
-      </p:grpSpPr>
-      <p:pic>
-        <p:nvPicPr>
-          <p:cNvPr id="7" name="Picture 6">
-            <a:extLst>
-              <a:ext uri="{FF2B5EF4-FFF2-40B4-BE49-F238E27FC236}">
-                <a16:creationId xmlns:a16="http://schemas.microsoft.com/office/drawing/2014/main" id="{F698521C-AC3C-D0E7-CF73-7BED228DCAC2}"/>
-              </a:ext>
-            </a:extLst>
-          </p:cNvPr>
-          <p:cNvPicPr>
-            <a:picLocks noChangeAspect="1"/>
-          </p:cNvPicPr>
-          <p:nvPr/>
-        </p:nvPicPr>
-        <p:blipFill>
-          <a:blip r:embed="rId2"/>
-          <a:stretch>
-            <a:fillRect/>
-          </a:stretch>
-        </p:blipFill>
-        <p:spPr>
-          <a:xfrm>
-            <a:off x="2017123" y="59181"/>
-            <a:ext cx="8939202" cy="6324543"/>
-          </a:xfrm>
-          <a:prstGeom prst="rect">
-            <a:avLst/>
-          </a:prstGeom>
-        </p:spPr>
-      </p:pic>
-      <p:sp>
-        <p:nvSpPr>
-          <p:cNvPr id="4" name="Slide Number Placeholder 3">
-            <a:extLst>
-              <a:ext uri="{FF2B5EF4-FFF2-40B4-BE49-F238E27FC236}">
-                <a16:creationId xmlns:a16="http://schemas.microsoft.com/office/drawing/2014/main" id="{19F019C2-FDAB-D9C9-9855-BB5E343ACFCD}"/>
-              </a:ext>
-            </a:extLst>
-          </p:cNvPr>
-          <p:cNvSpPr>
-            <a:spLocks noGrp="1"/>
-          </p:cNvSpPr>
-          <p:nvPr>
-            <p:ph type="sldNum" sz="quarter" idx="12"/>
-          </p:nvPr>
-        </p:nvSpPr>
-        <p:spPr/>
-        <p:txBody>
-          <a:bodyPr/>
-          <a:lstStyle/>
-          <a:p>
-            <a:fld id="{849D05A8-43E9-1C49-8606-50AB68220DEC}" type="slidenum">
-              <a:rPr lang="en-DE" smtClean="0"/>
-              <a:t>21</a:t>
-            </a:fld>
-            <a:endParaRPr lang="en-DE"/>
-          </a:p>
-        </p:txBody>
-      </p:sp>
-      <p:sp>
-        <p:nvSpPr>
-          <p:cNvPr id="11" name="TextBox 10">
-            <a:extLst>
-              <a:ext uri="{FF2B5EF4-FFF2-40B4-BE49-F238E27FC236}">
-                <a16:creationId xmlns:a16="http://schemas.microsoft.com/office/drawing/2014/main" id="{270CDBC3-B539-55CB-B014-F40DA823CDD0}"/>
-              </a:ext>
-            </a:extLst>
-          </p:cNvPr>
-          <p:cNvSpPr txBox="1"/>
-          <p:nvPr/>
-        </p:nvSpPr>
-        <p:spPr>
-          <a:xfrm>
-            <a:off x="271708" y="1762897"/>
-            <a:ext cx="1745415" cy="1015663"/>
-          </a:xfrm>
-          <a:prstGeom prst="rect">
-            <a:avLst/>
-          </a:prstGeom>
-          <a:noFill/>
-        </p:spPr>
-        <p:txBody>
-          <a:bodyPr wrap="square" rtlCol="0">
-            <a:spAutoFit/>
-          </a:bodyPr>
-          <a:lstStyle/>
-          <a:p>
-            <a:r>
-              <a:rPr lang="en-GB" sz="3000" dirty="0"/>
-              <a:t>Google’s </a:t>
-            </a:r>
-            <a:r>
-              <a:rPr lang="en-GB" sz="3000" dirty="0">
-                <a:hlinkClick r:id="rId3"/>
-              </a:rPr>
-              <a:t>Gemini</a:t>
-            </a:r>
-            <a:r>
-              <a:rPr lang="en-GB" sz="3000" dirty="0"/>
-              <a:t>:</a:t>
-            </a:r>
-          </a:p>
-        </p:txBody>
-      </p:sp>
-      <p:sp>
-        <p:nvSpPr>
-          <p:cNvPr id="2" name="TextBox 1">
-            <a:extLst>
-              <a:ext uri="{FF2B5EF4-FFF2-40B4-BE49-F238E27FC236}">
-                <a16:creationId xmlns:a16="http://schemas.microsoft.com/office/drawing/2014/main" id="{47DDED41-70D5-80B2-9BFF-9A06034857FF}"/>
-              </a:ext>
-            </a:extLst>
-          </p:cNvPr>
-          <p:cNvSpPr txBox="1"/>
-          <p:nvPr/>
-        </p:nvSpPr>
-        <p:spPr>
-          <a:xfrm>
-            <a:off x="279301" y="6352143"/>
-            <a:ext cx="6069418" cy="369332"/>
-          </a:xfrm>
-          <a:prstGeom prst="rect">
-            <a:avLst/>
-          </a:prstGeom>
-          <a:noFill/>
-        </p:spPr>
-        <p:txBody>
-          <a:bodyPr wrap="none" rtlCol="0">
-            <a:spAutoFit/>
-          </a:bodyPr>
-          <a:lstStyle/>
-          <a:p>
-            <a:r>
-              <a:rPr lang="en-GB" dirty="0"/>
-              <a:t>multimodal understanding of inputs: text, audio, images, video</a:t>
-            </a:r>
-          </a:p>
-        </p:txBody>
-      </p:sp>
-    </p:spTree>
-    <p:extLst>
-      <p:ext uri="{BB962C8B-B14F-4D97-AF65-F5344CB8AC3E}">
-        <p14:creationId xmlns:p14="http://schemas.microsoft.com/office/powerpoint/2010/main" val="1453300615"/>
       </p:ext>
     </p:extLst>
   </p:cSld>
@@ -8386,6 +9141,175 @@
           <a:chExt cx="0" cy="0"/>
         </a:xfrm>
       </p:grpSpPr>
+      <p:pic>
+        <p:nvPicPr>
+          <p:cNvPr id="7" name="Picture 6">
+            <a:extLst>
+              <a:ext uri="{FF2B5EF4-FFF2-40B4-BE49-F238E27FC236}">
+                <a16:creationId xmlns:a16="http://schemas.microsoft.com/office/drawing/2014/main" id="{F698521C-AC3C-D0E7-CF73-7BED228DCAC2}"/>
+              </a:ext>
+            </a:extLst>
+          </p:cNvPr>
+          <p:cNvPicPr>
+            <a:picLocks noChangeAspect="1"/>
+          </p:cNvPicPr>
+          <p:nvPr/>
+        </p:nvPicPr>
+        <p:blipFill>
+          <a:blip r:embed="rId2"/>
+          <a:stretch>
+            <a:fillRect/>
+          </a:stretch>
+        </p:blipFill>
+        <p:spPr>
+          <a:xfrm>
+            <a:off x="2017123" y="59181"/>
+            <a:ext cx="8939202" cy="6324543"/>
+          </a:xfrm>
+          <a:prstGeom prst="rect">
+            <a:avLst/>
+          </a:prstGeom>
+        </p:spPr>
+      </p:pic>
+      <p:sp>
+        <p:nvSpPr>
+          <p:cNvPr id="4" name="Slide Number Placeholder 3">
+            <a:extLst>
+              <a:ext uri="{FF2B5EF4-FFF2-40B4-BE49-F238E27FC236}">
+                <a16:creationId xmlns:a16="http://schemas.microsoft.com/office/drawing/2014/main" id="{19F019C2-FDAB-D9C9-9855-BB5E343ACFCD}"/>
+              </a:ext>
+            </a:extLst>
+          </p:cNvPr>
+          <p:cNvSpPr>
+            <a:spLocks noGrp="1"/>
+          </p:cNvSpPr>
+          <p:nvPr>
+            <p:ph type="sldNum" sz="quarter" idx="12"/>
+          </p:nvPr>
+        </p:nvSpPr>
+        <p:spPr/>
+        <p:txBody>
+          <a:bodyPr/>
+          <a:lstStyle/>
+          <a:p>
+            <a:fld id="{849D05A8-43E9-1C49-8606-50AB68220DEC}" type="slidenum">
+              <a:rPr lang="en-DE" smtClean="0"/>
+              <a:t>22</a:t>
+            </a:fld>
+            <a:endParaRPr lang="en-DE"/>
+          </a:p>
+        </p:txBody>
+      </p:sp>
+      <p:sp>
+        <p:nvSpPr>
+          <p:cNvPr id="11" name="TextBox 10">
+            <a:extLst>
+              <a:ext uri="{FF2B5EF4-FFF2-40B4-BE49-F238E27FC236}">
+                <a16:creationId xmlns:a16="http://schemas.microsoft.com/office/drawing/2014/main" id="{270CDBC3-B539-55CB-B014-F40DA823CDD0}"/>
+              </a:ext>
+            </a:extLst>
+          </p:cNvPr>
+          <p:cNvSpPr txBox="1"/>
+          <p:nvPr/>
+        </p:nvSpPr>
+        <p:spPr>
+          <a:xfrm>
+            <a:off x="271708" y="1762897"/>
+            <a:ext cx="1745415" cy="1015663"/>
+          </a:xfrm>
+          <a:prstGeom prst="rect">
+            <a:avLst/>
+          </a:prstGeom>
+          <a:noFill/>
+        </p:spPr>
+        <p:txBody>
+          <a:bodyPr wrap="square" rtlCol="0">
+            <a:spAutoFit/>
+          </a:bodyPr>
+          <a:lstStyle/>
+          <a:p>
+            <a:r>
+              <a:rPr lang="en-GB" sz="3000" dirty="0"/>
+              <a:t>Google’s </a:t>
+            </a:r>
+            <a:r>
+              <a:rPr lang="en-GB" sz="3000" dirty="0">
+                <a:hlinkClick r:id="rId3"/>
+              </a:rPr>
+              <a:t>Gemini</a:t>
+            </a:r>
+            <a:r>
+              <a:rPr lang="en-GB" sz="3000" dirty="0"/>
+              <a:t>:</a:t>
+            </a:r>
+          </a:p>
+        </p:txBody>
+      </p:sp>
+      <p:sp>
+        <p:nvSpPr>
+          <p:cNvPr id="2" name="TextBox 1">
+            <a:extLst>
+              <a:ext uri="{FF2B5EF4-FFF2-40B4-BE49-F238E27FC236}">
+                <a16:creationId xmlns:a16="http://schemas.microsoft.com/office/drawing/2014/main" id="{47DDED41-70D5-80B2-9BFF-9A06034857FF}"/>
+              </a:ext>
+            </a:extLst>
+          </p:cNvPr>
+          <p:cNvSpPr txBox="1"/>
+          <p:nvPr/>
+        </p:nvSpPr>
+        <p:spPr>
+          <a:xfrm>
+            <a:off x="279301" y="6352143"/>
+            <a:ext cx="6069418" cy="369332"/>
+          </a:xfrm>
+          <a:prstGeom prst="rect">
+            <a:avLst/>
+          </a:prstGeom>
+          <a:noFill/>
+        </p:spPr>
+        <p:txBody>
+          <a:bodyPr wrap="none" rtlCol="0">
+            <a:spAutoFit/>
+          </a:bodyPr>
+          <a:lstStyle/>
+          <a:p>
+            <a:r>
+              <a:rPr lang="en-GB" dirty="0"/>
+              <a:t>multimodal understanding of inputs: text, audio, images, video</a:t>
+            </a:r>
+          </a:p>
+        </p:txBody>
+      </p:sp>
+    </p:spTree>
+    <p:extLst>
+      <p:ext uri="{BB962C8B-B14F-4D97-AF65-F5344CB8AC3E}">
+        <p14:creationId xmlns:p14="http://schemas.microsoft.com/office/powerpoint/2010/main" val="1453300615"/>
+      </p:ext>
+    </p:extLst>
+  </p:cSld>
+  <p:clrMapOvr>
+    <a:masterClrMapping/>
+  </p:clrMapOvr>
+</p:sld>
+</file>
+
+<file path=ppt/slides/slide23.xml><?xml version="1.0" encoding="utf-8"?>
+<p:sld xmlns:a="http://schemas.openxmlformats.org/drawingml/2006/main" xmlns:r="http://schemas.openxmlformats.org/officeDocument/2006/relationships" xmlns:p="http://schemas.openxmlformats.org/presentationml/2006/main">
+  <p:cSld>
+    <p:spTree>
+      <p:nvGrpSpPr>
+        <p:cNvPr id="1" name=""/>
+        <p:cNvGrpSpPr/>
+        <p:nvPr/>
+      </p:nvGrpSpPr>
+      <p:grpSpPr>
+        <a:xfrm>
+          <a:off x="0" y="0"/>
+          <a:ext cx="0" cy="0"/>
+          <a:chOff x="0" y="0"/>
+          <a:chExt cx="0" cy="0"/>
+        </a:xfrm>
+      </p:grpSpPr>
       <p:sp>
         <p:nvSpPr>
           <p:cNvPr id="2" name="Title 1">
@@ -8565,7 +9489,7 @@
           <a:p>
             <a:fld id="{849D05A8-43E9-1C49-8606-50AB68220DEC}" type="slidenum">
               <a:rPr lang="en-DE" smtClean="0"/>
-              <a:t>22</a:t>
+              <a:t>23</a:t>
             </a:fld>
             <a:endParaRPr lang="en-DE"/>
           </a:p>

</xml_diff>